<commit_message>
add paper reviews and system_mistakes.md
</commit_message>
<xml_diff>
--- a/docs/lab_material/符号扩展.pptx
+++ b/docs/lab_material/符号扩展.pptx
@@ -1,33 +1,33 @@
 
 <file path=ppt/presentation.xml><?xml version="1.0" encoding="utf-8"?>
-<p:presentation xmlns:a="http://schemas.openxmlformats.org/drawingml/2006/main" xmlns:r="http://schemas.openxmlformats.org/officeDocument/2006/relationships" xmlns:p="http://schemas.openxmlformats.org/presentationml/2006/main" saveSubsetFonts="1">
+<p:presentation xmlns:a="http://schemas.openxmlformats.org/drawingml/2006/main" xmlns:r="http://schemas.openxmlformats.org/officeDocument/2006/relationships" xmlns:p="http://schemas.openxmlformats.org/presentationml/2006/main">
   <p:sldMasterIdLst>
-    <p:sldMasterId id="2147483660" r:id="rId1"/>
+    <p:sldMasterId id="2147483648" r:id="rId1"/>
   </p:sldMasterIdLst>
   <p:sldIdLst>
-    <p:sldId id="256" r:id="rId2"/>
-    <p:sldId id="257" r:id="rId3"/>
-    <p:sldId id="263" r:id="rId4"/>
-    <p:sldId id="258" r:id="rId5"/>
-    <p:sldId id="259" r:id="rId6"/>
-    <p:sldId id="262" r:id="rId7"/>
-    <p:sldId id="264" r:id="rId8"/>
-    <p:sldId id="260" r:id="rId9"/>
-    <p:sldId id="265" r:id="rId10"/>
-    <p:sldId id="266" r:id="rId11"/>
-    <p:sldId id="267" r:id="rId12"/>
-    <p:sldId id="268" r:id="rId13"/>
-    <p:sldId id="280" r:id="rId14"/>
-    <p:sldId id="281" r:id="rId15"/>
-    <p:sldId id="276" r:id="rId16"/>
-    <p:sldId id="282" r:id="rId17"/>
-    <p:sldId id="283" r:id="rId18"/>
-    <p:sldId id="284" r:id="rId19"/>
-    <p:sldId id="285" r:id="rId20"/>
-    <p:sldId id="286" r:id="rId21"/>
-    <p:sldId id="275" r:id="rId22"/>
-    <p:sldId id="277" r:id="rId23"/>
-    <p:sldId id="278" r:id="rId24"/>
+    <p:sldId id="256" r:id="rId3"/>
+    <p:sldId id="257" r:id="rId4"/>
+    <p:sldId id="263" r:id="rId5"/>
+    <p:sldId id="258" r:id="rId6"/>
+    <p:sldId id="259" r:id="rId7"/>
+    <p:sldId id="262" r:id="rId8"/>
+    <p:sldId id="264" r:id="rId9"/>
+    <p:sldId id="260" r:id="rId10"/>
+    <p:sldId id="265" r:id="rId11"/>
+    <p:sldId id="266" r:id="rId12"/>
+    <p:sldId id="267" r:id="rId13"/>
+    <p:sldId id="268" r:id="rId14"/>
+    <p:sldId id="280" r:id="rId15"/>
+    <p:sldId id="281" r:id="rId16"/>
+    <p:sldId id="276" r:id="rId17"/>
+    <p:sldId id="282" r:id="rId18"/>
+    <p:sldId id="283" r:id="rId19"/>
+    <p:sldId id="284" r:id="rId20"/>
+    <p:sldId id="285" r:id="rId21"/>
+    <p:sldId id="286" r:id="rId22"/>
+    <p:sldId id="275" r:id="rId23"/>
+    <p:sldId id="277" r:id="rId24"/>
+    <p:sldId id="278" r:id="rId25"/>
   </p:sldIdLst>
   <p:sldSz cx="9144000" cy="6858000" type="screen4x3"/>
   <p:notesSz cx="6858000" cy="9144000"/>
@@ -310,7 +310,6 @@
           <a:p>
             <a:fld id="{530820CF-B880-4189-942D-D702A7CBA730}" type="datetimeFigureOut">
               <a:rPr lang="zh-CN" altLang="en-US" smtClean="0"/>
-              <a:t>2012/5/21</a:t>
             </a:fld>
             <a:endParaRPr lang="zh-CN" altLang="en-US"/>
           </a:p>
@@ -352,18 +351,12 @@
           <a:p>
             <a:fld id="{0C913308-F349-4B6D-A68A-DD1791B4A57B}" type="slidenum">
               <a:rPr lang="zh-CN" altLang="en-US" smtClean="0"/>
-              <a:t>‹#›</a:t>
             </a:fld>
             <a:endParaRPr lang="zh-CN" altLang="en-US"/>
           </a:p>
         </p:txBody>
       </p:sp>
     </p:spTree>
-    <p:extLst>
-      <p:ext uri="{BB962C8B-B14F-4D97-AF65-F5344CB8AC3E}">
-        <p14:creationId xmlns:p14="http://schemas.microsoft.com/office/powerpoint/2010/main" val="1613547510"/>
-      </p:ext>
-    </p:extLst>
   </p:cSld>
   <p:clrMapOvr>
     <a:masterClrMapping/>
@@ -438,6 +431,7 @@
               <a:rPr lang="zh-CN" altLang="en-US" smtClean="0"/>
               <a:t>单击此处编辑母版文本样式</a:t>
             </a:r>
+            <a:endParaRPr lang="zh-CN" altLang="en-US" smtClean="0"/>
           </a:p>
           <a:p>
             <a:pPr lvl="1"/>
@@ -445,6 +439,7 @@
               <a:rPr lang="zh-CN" altLang="en-US" smtClean="0"/>
               <a:t>第二级</a:t>
             </a:r>
+            <a:endParaRPr lang="zh-CN" altLang="en-US" smtClean="0"/>
           </a:p>
           <a:p>
             <a:pPr lvl="2"/>
@@ -452,6 +447,7 @@
               <a:rPr lang="zh-CN" altLang="en-US" smtClean="0"/>
               <a:t>第三级</a:t>
             </a:r>
+            <a:endParaRPr lang="zh-CN" altLang="en-US" smtClean="0"/>
           </a:p>
           <a:p>
             <a:pPr lvl="3"/>
@@ -459,6 +455,7 @@
               <a:rPr lang="zh-CN" altLang="en-US" smtClean="0"/>
               <a:t>第四级</a:t>
             </a:r>
+            <a:endParaRPr lang="zh-CN" altLang="en-US" smtClean="0"/>
           </a:p>
           <a:p>
             <a:pPr lvl="4"/>
@@ -487,7 +484,6 @@
           <a:p>
             <a:fld id="{530820CF-B880-4189-942D-D702A7CBA730}" type="datetimeFigureOut">
               <a:rPr lang="zh-CN" altLang="en-US" smtClean="0"/>
-              <a:t>2012/5/21</a:t>
             </a:fld>
             <a:endParaRPr lang="zh-CN" altLang="en-US"/>
           </a:p>
@@ -529,18 +525,12 @@
           <a:p>
             <a:fld id="{0C913308-F349-4B6D-A68A-DD1791B4A57B}" type="slidenum">
               <a:rPr lang="zh-CN" altLang="en-US" smtClean="0"/>
-              <a:t>‹#›</a:t>
             </a:fld>
             <a:endParaRPr lang="zh-CN" altLang="en-US"/>
           </a:p>
         </p:txBody>
       </p:sp>
     </p:spTree>
-    <p:extLst>
-      <p:ext uri="{BB962C8B-B14F-4D97-AF65-F5344CB8AC3E}">
-        <p14:creationId xmlns:p14="http://schemas.microsoft.com/office/powerpoint/2010/main" val="1672133535"/>
-      </p:ext>
-    </p:extLst>
   </p:cSld>
   <p:clrMapOvr>
     <a:masterClrMapping/>
@@ -618,6 +608,7 @@
               <a:rPr lang="zh-CN" altLang="en-US" smtClean="0"/>
               <a:t>单击此处编辑母版文本样式</a:t>
             </a:r>
+            <a:endParaRPr lang="zh-CN" altLang="en-US" smtClean="0"/>
           </a:p>
           <a:p>
             <a:pPr lvl="1"/>
@@ -625,6 +616,7 @@
               <a:rPr lang="zh-CN" altLang="en-US" smtClean="0"/>
               <a:t>第二级</a:t>
             </a:r>
+            <a:endParaRPr lang="zh-CN" altLang="en-US" smtClean="0"/>
           </a:p>
           <a:p>
             <a:pPr lvl="2"/>
@@ -632,6 +624,7 @@
               <a:rPr lang="zh-CN" altLang="en-US" smtClean="0"/>
               <a:t>第三级</a:t>
             </a:r>
+            <a:endParaRPr lang="zh-CN" altLang="en-US" smtClean="0"/>
           </a:p>
           <a:p>
             <a:pPr lvl="3"/>
@@ -639,6 +632,7 @@
               <a:rPr lang="zh-CN" altLang="en-US" smtClean="0"/>
               <a:t>第四级</a:t>
             </a:r>
+            <a:endParaRPr lang="zh-CN" altLang="en-US" smtClean="0"/>
           </a:p>
           <a:p>
             <a:pPr lvl="4"/>
@@ -667,7 +661,6 @@
           <a:p>
             <a:fld id="{530820CF-B880-4189-942D-D702A7CBA730}" type="datetimeFigureOut">
               <a:rPr lang="zh-CN" altLang="en-US" smtClean="0"/>
-              <a:t>2012/5/21</a:t>
             </a:fld>
             <a:endParaRPr lang="zh-CN" altLang="en-US"/>
           </a:p>
@@ -709,18 +702,12 @@
           <a:p>
             <a:fld id="{0C913308-F349-4B6D-A68A-DD1791B4A57B}" type="slidenum">
               <a:rPr lang="zh-CN" altLang="en-US" smtClean="0"/>
-              <a:t>‹#›</a:t>
             </a:fld>
             <a:endParaRPr lang="zh-CN" altLang="en-US"/>
           </a:p>
         </p:txBody>
       </p:sp>
     </p:spTree>
-    <p:extLst>
-      <p:ext uri="{BB962C8B-B14F-4D97-AF65-F5344CB8AC3E}">
-        <p14:creationId xmlns:p14="http://schemas.microsoft.com/office/powerpoint/2010/main" val="1922113938"/>
-      </p:ext>
-    </p:extLst>
   </p:cSld>
   <p:clrMapOvr>
     <a:masterClrMapping/>
@@ -788,6 +775,7 @@
               <a:rPr lang="zh-CN" altLang="en-US" smtClean="0"/>
               <a:t>单击此处编辑母版文本样式</a:t>
             </a:r>
+            <a:endParaRPr lang="zh-CN" altLang="en-US" smtClean="0"/>
           </a:p>
           <a:p>
             <a:pPr lvl="1"/>
@@ -795,6 +783,7 @@
               <a:rPr lang="zh-CN" altLang="en-US" smtClean="0"/>
               <a:t>第二级</a:t>
             </a:r>
+            <a:endParaRPr lang="zh-CN" altLang="en-US" smtClean="0"/>
           </a:p>
           <a:p>
             <a:pPr lvl="2"/>
@@ -802,6 +791,7 @@
               <a:rPr lang="zh-CN" altLang="en-US" smtClean="0"/>
               <a:t>第三级</a:t>
             </a:r>
+            <a:endParaRPr lang="zh-CN" altLang="en-US" smtClean="0"/>
           </a:p>
           <a:p>
             <a:pPr lvl="3"/>
@@ -809,6 +799,7 @@
               <a:rPr lang="zh-CN" altLang="en-US" smtClean="0"/>
               <a:t>第四级</a:t>
             </a:r>
+            <a:endParaRPr lang="zh-CN" altLang="en-US" smtClean="0"/>
           </a:p>
           <a:p>
             <a:pPr lvl="4"/>
@@ -837,7 +828,6 @@
           <a:p>
             <a:fld id="{530820CF-B880-4189-942D-D702A7CBA730}" type="datetimeFigureOut">
               <a:rPr lang="zh-CN" altLang="en-US" smtClean="0"/>
-              <a:t>2012/5/21</a:t>
             </a:fld>
             <a:endParaRPr lang="zh-CN" altLang="en-US"/>
           </a:p>
@@ -879,18 +869,12 @@
           <a:p>
             <a:fld id="{0C913308-F349-4B6D-A68A-DD1791B4A57B}" type="slidenum">
               <a:rPr lang="zh-CN" altLang="en-US" smtClean="0"/>
-              <a:t>‹#›</a:t>
             </a:fld>
             <a:endParaRPr lang="zh-CN" altLang="en-US"/>
           </a:p>
         </p:txBody>
       </p:sp>
     </p:spTree>
-    <p:extLst>
-      <p:ext uri="{BB962C8B-B14F-4D97-AF65-F5344CB8AC3E}">
-        <p14:creationId xmlns:p14="http://schemas.microsoft.com/office/powerpoint/2010/main" val="3245896717"/>
-      </p:ext>
-    </p:extLst>
   </p:cSld>
   <p:clrMapOvr>
     <a:masterClrMapping/>
@@ -1070,6 +1054,7 @@
               <a:rPr lang="zh-CN" altLang="en-US" smtClean="0"/>
               <a:t>单击此处编辑母版文本样式</a:t>
             </a:r>
+            <a:endParaRPr lang="zh-CN" altLang="en-US" smtClean="0"/>
           </a:p>
         </p:txBody>
       </p:sp>
@@ -1090,7 +1075,6 @@
           <a:p>
             <a:fld id="{530820CF-B880-4189-942D-D702A7CBA730}" type="datetimeFigureOut">
               <a:rPr lang="zh-CN" altLang="en-US" smtClean="0"/>
-              <a:t>2012/5/21</a:t>
             </a:fld>
             <a:endParaRPr lang="zh-CN" altLang="en-US"/>
           </a:p>
@@ -1132,18 +1116,12 @@
           <a:p>
             <a:fld id="{0C913308-F349-4B6D-A68A-DD1791B4A57B}" type="slidenum">
               <a:rPr lang="zh-CN" altLang="en-US" smtClean="0"/>
-              <a:t>‹#›</a:t>
             </a:fld>
             <a:endParaRPr lang="zh-CN" altLang="en-US"/>
           </a:p>
         </p:txBody>
       </p:sp>
     </p:spTree>
-    <p:extLst>
-      <p:ext uri="{BB962C8B-B14F-4D97-AF65-F5344CB8AC3E}">
-        <p14:creationId xmlns:p14="http://schemas.microsoft.com/office/powerpoint/2010/main" val="2420515936"/>
-      </p:ext>
-    </p:extLst>
   </p:cSld>
   <p:clrMapOvr>
     <a:masterClrMapping/>
@@ -1244,6 +1222,7 @@
               <a:rPr lang="zh-CN" altLang="en-US" smtClean="0"/>
               <a:t>单击此处编辑母版文本样式</a:t>
             </a:r>
+            <a:endParaRPr lang="zh-CN" altLang="en-US" smtClean="0"/>
           </a:p>
           <a:p>
             <a:pPr lvl="1"/>
@@ -1251,6 +1230,7 @@
               <a:rPr lang="zh-CN" altLang="en-US" smtClean="0"/>
               <a:t>第二级</a:t>
             </a:r>
+            <a:endParaRPr lang="zh-CN" altLang="en-US" smtClean="0"/>
           </a:p>
           <a:p>
             <a:pPr lvl="2"/>
@@ -1258,6 +1238,7 @@
               <a:rPr lang="zh-CN" altLang="en-US" smtClean="0"/>
               <a:t>第三级</a:t>
             </a:r>
+            <a:endParaRPr lang="zh-CN" altLang="en-US" smtClean="0"/>
           </a:p>
           <a:p>
             <a:pPr lvl="3"/>
@@ -1265,6 +1246,7 @@
               <a:rPr lang="zh-CN" altLang="en-US" smtClean="0"/>
               <a:t>第四级</a:t>
             </a:r>
+            <a:endParaRPr lang="zh-CN" altLang="en-US" smtClean="0"/>
           </a:p>
           <a:p>
             <a:pPr lvl="4"/>
@@ -1329,6 +1311,7 @@
               <a:rPr lang="zh-CN" altLang="en-US" smtClean="0"/>
               <a:t>单击此处编辑母版文本样式</a:t>
             </a:r>
+            <a:endParaRPr lang="zh-CN" altLang="en-US" smtClean="0"/>
           </a:p>
           <a:p>
             <a:pPr lvl="1"/>
@@ -1336,6 +1319,7 @@
               <a:rPr lang="zh-CN" altLang="en-US" smtClean="0"/>
               <a:t>第二级</a:t>
             </a:r>
+            <a:endParaRPr lang="zh-CN" altLang="en-US" smtClean="0"/>
           </a:p>
           <a:p>
             <a:pPr lvl="2"/>
@@ -1343,6 +1327,7 @@
               <a:rPr lang="zh-CN" altLang="en-US" smtClean="0"/>
               <a:t>第三级</a:t>
             </a:r>
+            <a:endParaRPr lang="zh-CN" altLang="en-US" smtClean="0"/>
           </a:p>
           <a:p>
             <a:pPr lvl="3"/>
@@ -1350,6 +1335,7 @@
               <a:rPr lang="zh-CN" altLang="en-US" smtClean="0"/>
               <a:t>第四级</a:t>
             </a:r>
+            <a:endParaRPr lang="zh-CN" altLang="en-US" smtClean="0"/>
           </a:p>
           <a:p>
             <a:pPr lvl="4"/>
@@ -1378,7 +1364,6 @@
           <a:p>
             <a:fld id="{530820CF-B880-4189-942D-D702A7CBA730}" type="datetimeFigureOut">
               <a:rPr lang="zh-CN" altLang="en-US" smtClean="0"/>
-              <a:t>2012/5/21</a:t>
             </a:fld>
             <a:endParaRPr lang="zh-CN" altLang="en-US"/>
           </a:p>
@@ -1420,18 +1405,12 @@
           <a:p>
             <a:fld id="{0C913308-F349-4B6D-A68A-DD1791B4A57B}" type="slidenum">
               <a:rPr lang="zh-CN" altLang="en-US" smtClean="0"/>
-              <a:t>‹#›</a:t>
             </a:fld>
             <a:endParaRPr lang="zh-CN" altLang="en-US"/>
           </a:p>
         </p:txBody>
       </p:sp>
     </p:spTree>
-    <p:extLst>
-      <p:ext uri="{BB962C8B-B14F-4D97-AF65-F5344CB8AC3E}">
-        <p14:creationId xmlns:p14="http://schemas.microsoft.com/office/powerpoint/2010/main" val="1367402106"/>
-      </p:ext>
-    </p:extLst>
   </p:cSld>
   <p:clrMapOvr>
     <a:masterClrMapping/>
@@ -1545,6 +1524,7 @@
               <a:rPr lang="zh-CN" altLang="en-US" smtClean="0"/>
               <a:t>单击此处编辑母版文本样式</a:t>
             </a:r>
+            <a:endParaRPr lang="zh-CN" altLang="en-US" smtClean="0"/>
           </a:p>
         </p:txBody>
       </p:sp>
@@ -1601,6 +1581,7 @@
               <a:rPr lang="zh-CN" altLang="en-US" smtClean="0"/>
               <a:t>单击此处编辑母版文本样式</a:t>
             </a:r>
+            <a:endParaRPr lang="zh-CN" altLang="en-US" smtClean="0"/>
           </a:p>
           <a:p>
             <a:pPr lvl="1"/>
@@ -1608,6 +1589,7 @@
               <a:rPr lang="zh-CN" altLang="en-US" smtClean="0"/>
               <a:t>第二级</a:t>
             </a:r>
+            <a:endParaRPr lang="zh-CN" altLang="en-US" smtClean="0"/>
           </a:p>
           <a:p>
             <a:pPr lvl="2"/>
@@ -1615,6 +1597,7 @@
               <a:rPr lang="zh-CN" altLang="en-US" smtClean="0"/>
               <a:t>第三级</a:t>
             </a:r>
+            <a:endParaRPr lang="zh-CN" altLang="en-US" smtClean="0"/>
           </a:p>
           <a:p>
             <a:pPr lvl="3"/>
@@ -1622,6 +1605,7 @@
               <a:rPr lang="zh-CN" altLang="en-US" smtClean="0"/>
               <a:t>第四级</a:t>
             </a:r>
+            <a:endParaRPr lang="zh-CN" altLang="en-US" smtClean="0"/>
           </a:p>
           <a:p>
             <a:pPr lvl="4"/>
@@ -1695,6 +1679,7 @@
               <a:rPr lang="zh-CN" altLang="en-US" smtClean="0"/>
               <a:t>单击此处编辑母版文本样式</a:t>
             </a:r>
+            <a:endParaRPr lang="zh-CN" altLang="en-US" smtClean="0"/>
           </a:p>
         </p:txBody>
       </p:sp>
@@ -1751,6 +1736,7 @@
               <a:rPr lang="zh-CN" altLang="en-US" smtClean="0"/>
               <a:t>单击此处编辑母版文本样式</a:t>
             </a:r>
+            <a:endParaRPr lang="zh-CN" altLang="en-US" smtClean="0"/>
           </a:p>
           <a:p>
             <a:pPr lvl="1"/>
@@ -1758,6 +1744,7 @@
               <a:rPr lang="zh-CN" altLang="en-US" smtClean="0"/>
               <a:t>第二级</a:t>
             </a:r>
+            <a:endParaRPr lang="zh-CN" altLang="en-US" smtClean="0"/>
           </a:p>
           <a:p>
             <a:pPr lvl="2"/>
@@ -1765,6 +1752,7 @@
               <a:rPr lang="zh-CN" altLang="en-US" smtClean="0"/>
               <a:t>第三级</a:t>
             </a:r>
+            <a:endParaRPr lang="zh-CN" altLang="en-US" smtClean="0"/>
           </a:p>
           <a:p>
             <a:pPr lvl="3"/>
@@ -1772,6 +1760,7 @@
               <a:rPr lang="zh-CN" altLang="en-US" smtClean="0"/>
               <a:t>第四级</a:t>
             </a:r>
+            <a:endParaRPr lang="zh-CN" altLang="en-US" smtClean="0"/>
           </a:p>
           <a:p>
             <a:pPr lvl="4"/>
@@ -1800,7 +1789,6 @@
           <a:p>
             <a:fld id="{530820CF-B880-4189-942D-D702A7CBA730}" type="datetimeFigureOut">
               <a:rPr lang="zh-CN" altLang="en-US" smtClean="0"/>
-              <a:t>2012/5/21</a:t>
             </a:fld>
             <a:endParaRPr lang="zh-CN" altLang="en-US"/>
           </a:p>
@@ -1842,18 +1830,12 @@
           <a:p>
             <a:fld id="{0C913308-F349-4B6D-A68A-DD1791B4A57B}" type="slidenum">
               <a:rPr lang="zh-CN" altLang="en-US" smtClean="0"/>
-              <a:t>‹#›</a:t>
             </a:fld>
             <a:endParaRPr lang="zh-CN" altLang="en-US"/>
           </a:p>
         </p:txBody>
       </p:sp>
     </p:spTree>
-    <p:extLst>
-      <p:ext uri="{BB962C8B-B14F-4D97-AF65-F5344CB8AC3E}">
-        <p14:creationId xmlns:p14="http://schemas.microsoft.com/office/powerpoint/2010/main" val="2365236033"/>
-      </p:ext>
-    </p:extLst>
   </p:cSld>
   <p:clrMapOvr>
     <a:masterClrMapping/>
@@ -1918,7 +1900,6 @@
           <a:p>
             <a:fld id="{530820CF-B880-4189-942D-D702A7CBA730}" type="datetimeFigureOut">
               <a:rPr lang="zh-CN" altLang="en-US" smtClean="0"/>
-              <a:t>2012/5/21</a:t>
             </a:fld>
             <a:endParaRPr lang="zh-CN" altLang="en-US"/>
           </a:p>
@@ -1960,18 +1941,12 @@
           <a:p>
             <a:fld id="{0C913308-F349-4B6D-A68A-DD1791B4A57B}" type="slidenum">
               <a:rPr lang="zh-CN" altLang="en-US" smtClean="0"/>
-              <a:t>‹#›</a:t>
             </a:fld>
             <a:endParaRPr lang="zh-CN" altLang="en-US"/>
           </a:p>
         </p:txBody>
       </p:sp>
     </p:spTree>
-    <p:extLst>
-      <p:ext uri="{BB962C8B-B14F-4D97-AF65-F5344CB8AC3E}">
-        <p14:creationId xmlns:p14="http://schemas.microsoft.com/office/powerpoint/2010/main" val="2504045516"/>
-      </p:ext>
-    </p:extLst>
   </p:cSld>
   <p:clrMapOvr>
     <a:masterClrMapping/>
@@ -2013,7 +1988,6 @@
           <a:p>
             <a:fld id="{530820CF-B880-4189-942D-D702A7CBA730}" type="datetimeFigureOut">
               <a:rPr lang="zh-CN" altLang="en-US" smtClean="0"/>
-              <a:t>2012/5/21</a:t>
             </a:fld>
             <a:endParaRPr lang="zh-CN" altLang="en-US"/>
           </a:p>
@@ -2055,18 +2029,12 @@
           <a:p>
             <a:fld id="{0C913308-F349-4B6D-A68A-DD1791B4A57B}" type="slidenum">
               <a:rPr lang="zh-CN" altLang="en-US" smtClean="0"/>
-              <a:t>‹#›</a:t>
             </a:fld>
             <a:endParaRPr lang="zh-CN" altLang="en-US"/>
           </a:p>
         </p:txBody>
       </p:sp>
     </p:spTree>
-    <p:extLst>
-      <p:ext uri="{BB962C8B-B14F-4D97-AF65-F5344CB8AC3E}">
-        <p14:creationId xmlns:p14="http://schemas.microsoft.com/office/powerpoint/2010/main" val="1867690347"/>
-      </p:ext>
-    </p:extLst>
   </p:cSld>
   <p:clrMapOvr>
     <a:masterClrMapping/>
@@ -2176,6 +2144,7 @@
               <a:rPr lang="zh-CN" altLang="en-US" smtClean="0"/>
               <a:t>单击此处编辑母版文本样式</a:t>
             </a:r>
+            <a:endParaRPr lang="zh-CN" altLang="en-US" smtClean="0"/>
           </a:p>
           <a:p>
             <a:pPr lvl="1"/>
@@ -2183,6 +2152,7 @@
               <a:rPr lang="zh-CN" altLang="en-US" smtClean="0"/>
               <a:t>第二级</a:t>
             </a:r>
+            <a:endParaRPr lang="zh-CN" altLang="en-US" smtClean="0"/>
           </a:p>
           <a:p>
             <a:pPr lvl="2"/>
@@ -2190,6 +2160,7 @@
               <a:rPr lang="zh-CN" altLang="en-US" smtClean="0"/>
               <a:t>第三级</a:t>
             </a:r>
+            <a:endParaRPr lang="zh-CN" altLang="en-US" smtClean="0"/>
           </a:p>
           <a:p>
             <a:pPr lvl="3"/>
@@ -2197,6 +2168,7 @@
               <a:rPr lang="zh-CN" altLang="en-US" smtClean="0"/>
               <a:t>第四级</a:t>
             </a:r>
+            <a:endParaRPr lang="zh-CN" altLang="en-US" smtClean="0"/>
           </a:p>
           <a:p>
             <a:pPr lvl="4"/>
@@ -2270,6 +2242,7 @@
               <a:rPr lang="zh-CN" altLang="en-US" smtClean="0"/>
               <a:t>单击此处编辑母版文本样式</a:t>
             </a:r>
+            <a:endParaRPr lang="zh-CN" altLang="en-US" smtClean="0"/>
           </a:p>
         </p:txBody>
       </p:sp>
@@ -2290,7 +2263,6 @@
           <a:p>
             <a:fld id="{530820CF-B880-4189-942D-D702A7CBA730}" type="datetimeFigureOut">
               <a:rPr lang="zh-CN" altLang="en-US" smtClean="0"/>
-              <a:t>2012/5/21</a:t>
             </a:fld>
             <a:endParaRPr lang="zh-CN" altLang="en-US"/>
           </a:p>
@@ -2332,18 +2304,12 @@
           <a:p>
             <a:fld id="{0C913308-F349-4B6D-A68A-DD1791B4A57B}" type="slidenum">
               <a:rPr lang="zh-CN" altLang="en-US" smtClean="0"/>
-              <a:t>‹#›</a:t>
             </a:fld>
             <a:endParaRPr lang="zh-CN" altLang="en-US"/>
           </a:p>
         </p:txBody>
       </p:sp>
     </p:spTree>
-    <p:extLst>
-      <p:ext uri="{BB962C8B-B14F-4D97-AF65-F5344CB8AC3E}">
-        <p14:creationId xmlns:p14="http://schemas.microsoft.com/office/powerpoint/2010/main" val="2364170681"/>
-      </p:ext>
-    </p:extLst>
   </p:cSld>
   <p:clrMapOvr>
     <a:masterClrMapping/>
@@ -2527,6 +2493,7 @@
               <a:rPr lang="zh-CN" altLang="en-US" smtClean="0"/>
               <a:t>单击此处编辑母版文本样式</a:t>
             </a:r>
+            <a:endParaRPr lang="zh-CN" altLang="en-US" smtClean="0"/>
           </a:p>
         </p:txBody>
       </p:sp>
@@ -2547,7 +2514,6 @@
           <a:p>
             <a:fld id="{530820CF-B880-4189-942D-D702A7CBA730}" type="datetimeFigureOut">
               <a:rPr lang="zh-CN" altLang="en-US" smtClean="0"/>
-              <a:t>2012/5/21</a:t>
             </a:fld>
             <a:endParaRPr lang="zh-CN" altLang="en-US"/>
           </a:p>
@@ -2589,18 +2555,12 @@
           <a:p>
             <a:fld id="{0C913308-F349-4B6D-A68A-DD1791B4A57B}" type="slidenum">
               <a:rPr lang="zh-CN" altLang="en-US" smtClean="0"/>
-              <a:t>‹#›</a:t>
             </a:fld>
             <a:endParaRPr lang="zh-CN" altLang="en-US"/>
           </a:p>
         </p:txBody>
       </p:sp>
     </p:spTree>
-    <p:extLst>
-      <p:ext uri="{BB962C8B-B14F-4D97-AF65-F5344CB8AC3E}">
-        <p14:creationId xmlns:p14="http://schemas.microsoft.com/office/powerpoint/2010/main" val="2088941431"/>
-      </p:ext>
-    </p:extLst>
   </p:cSld>
   <p:clrMapOvr>
     <a:masterClrMapping/>
@@ -2707,6 +2667,7 @@
               <a:rPr lang="zh-CN" altLang="en-US" smtClean="0"/>
               <a:t>单击此处编辑母版文本样式</a:t>
             </a:r>
+            <a:endParaRPr lang="zh-CN" altLang="en-US" smtClean="0"/>
           </a:p>
           <a:p>
             <a:pPr lvl="1"/>
@@ -2714,6 +2675,7 @@
               <a:rPr lang="zh-CN" altLang="en-US" smtClean="0"/>
               <a:t>第二级</a:t>
             </a:r>
+            <a:endParaRPr lang="zh-CN" altLang="en-US" smtClean="0"/>
           </a:p>
           <a:p>
             <a:pPr lvl="2"/>
@@ -2721,6 +2683,7 @@
               <a:rPr lang="zh-CN" altLang="en-US" smtClean="0"/>
               <a:t>第三级</a:t>
             </a:r>
+            <a:endParaRPr lang="zh-CN" altLang="en-US" smtClean="0"/>
           </a:p>
           <a:p>
             <a:pPr lvl="3"/>
@@ -2728,6 +2691,7 @@
               <a:rPr lang="zh-CN" altLang="en-US" smtClean="0"/>
               <a:t>第四级</a:t>
             </a:r>
+            <a:endParaRPr lang="zh-CN" altLang="en-US" smtClean="0"/>
           </a:p>
           <a:p>
             <a:pPr lvl="4"/>
@@ -2774,7 +2738,6 @@
           <a:p>
             <a:fld id="{530820CF-B880-4189-942D-D702A7CBA730}" type="datetimeFigureOut">
               <a:rPr lang="zh-CN" altLang="en-US" smtClean="0"/>
-              <a:t>2012/5/21</a:t>
             </a:fld>
             <a:endParaRPr lang="zh-CN" altLang="en-US"/>
           </a:p>
@@ -2852,7 +2815,6 @@
           <a:p>
             <a:fld id="{0C913308-F349-4B6D-A68A-DD1791B4A57B}" type="slidenum">
               <a:rPr lang="zh-CN" altLang="en-US" smtClean="0"/>
-              <a:t>‹#›</a:t>
             </a:fld>
             <a:endParaRPr lang="zh-CN" altLang="en-US"/>
           </a:p>
@@ -2867,7 +2829,7 @@
           <p:nvPr/>
         </p:nvPicPr>
         <p:blipFill>
-          <a:blip r:embed="rId13" cstate="print">
+          <a:blip r:embed="rId12" cstate="print">
             <a:extLst>
               <a:ext uri="{28A0092B-C50C-407E-A947-70E740481C1C}">
                 <a14:useLocalDpi xmlns:a14="http://schemas.microsoft.com/office/drawing/2010/main" val="0"/>
@@ -2900,25 +2862,20 @@
         </p:spPr>
       </p:pic>
     </p:spTree>
-    <p:extLst>
-      <p:ext uri="{BB962C8B-B14F-4D97-AF65-F5344CB8AC3E}">
-        <p14:creationId xmlns:p14="http://schemas.microsoft.com/office/powerpoint/2010/main" val="1750986537"/>
-      </p:ext>
-    </p:extLst>
   </p:cSld>
   <p:clrMap bg1="lt1" tx1="dk1" bg2="lt2" tx2="dk2" accent1="accent1" accent2="accent2" accent3="accent3" accent4="accent4" accent5="accent5" accent6="accent6" hlink="hlink" folHlink="folHlink"/>
   <p:sldLayoutIdLst>
-    <p:sldLayoutId id="2147483661" r:id="rId1"/>
-    <p:sldLayoutId id="2147483662" r:id="rId2"/>
-    <p:sldLayoutId id="2147483663" r:id="rId3"/>
-    <p:sldLayoutId id="2147483664" r:id="rId4"/>
-    <p:sldLayoutId id="2147483665" r:id="rId5"/>
-    <p:sldLayoutId id="2147483666" r:id="rId6"/>
-    <p:sldLayoutId id="2147483667" r:id="rId7"/>
-    <p:sldLayoutId id="2147483668" r:id="rId8"/>
-    <p:sldLayoutId id="2147483669" r:id="rId9"/>
-    <p:sldLayoutId id="2147483670" r:id="rId10"/>
-    <p:sldLayoutId id="2147483671" r:id="rId11"/>
+    <p:sldLayoutId id="2147483649" r:id="rId1"/>
+    <p:sldLayoutId id="2147483650" r:id="rId2"/>
+    <p:sldLayoutId id="2147483651" r:id="rId3"/>
+    <p:sldLayoutId id="2147483652" r:id="rId4"/>
+    <p:sldLayoutId id="2147483653" r:id="rId5"/>
+    <p:sldLayoutId id="2147483654" r:id="rId6"/>
+    <p:sldLayoutId id="2147483655" r:id="rId7"/>
+    <p:sldLayoutId id="2147483656" r:id="rId8"/>
+    <p:sldLayoutId id="2147483657" r:id="rId9"/>
+    <p:sldLayoutId id="2147483658" r:id="rId10"/>
+    <p:sldLayoutId id="2147483659" r:id="rId11"/>
   </p:sldLayoutIdLst>
   <p:timing>
     <p:tnLst>
@@ -2949,7 +2906,7 @@
         <a:spcBef>
           <a:spcPct val="20000"/>
         </a:spcBef>
-        <a:buFont typeface="Arial" pitchFamily="34" charset="0"/>
+        <a:buFont typeface="Arial" panose="02080604020202020204" pitchFamily="34" charset="0"/>
         <a:buChar char="•"/>
         <a:defRPr sz="3200" kern="1200">
           <a:solidFill>
@@ -2964,7 +2921,7 @@
         <a:spcBef>
           <a:spcPct val="20000"/>
         </a:spcBef>
-        <a:buFont typeface="Arial" pitchFamily="34" charset="0"/>
+        <a:buFont typeface="Arial" panose="02080604020202020204" pitchFamily="34" charset="0"/>
         <a:buChar char="–"/>
         <a:defRPr sz="2800" kern="1200">
           <a:solidFill>
@@ -2979,7 +2936,7 @@
         <a:spcBef>
           <a:spcPct val="20000"/>
         </a:spcBef>
-        <a:buFont typeface="Arial" pitchFamily="34" charset="0"/>
+        <a:buFont typeface="Arial" panose="02080604020202020204" pitchFamily="34" charset="0"/>
         <a:buChar char="•"/>
         <a:defRPr sz="2400" kern="1200">
           <a:solidFill>
@@ -2994,7 +2951,7 @@
         <a:spcBef>
           <a:spcPct val="20000"/>
         </a:spcBef>
-        <a:buFont typeface="Arial" pitchFamily="34" charset="0"/>
+        <a:buFont typeface="Arial" panose="02080604020202020204" pitchFamily="34" charset="0"/>
         <a:buChar char="–"/>
         <a:defRPr sz="2000" kern="1200">
           <a:solidFill>
@@ -3009,7 +2966,7 @@
         <a:spcBef>
           <a:spcPct val="20000"/>
         </a:spcBef>
-        <a:buFont typeface="Arial" pitchFamily="34" charset="0"/>
+        <a:buFont typeface="Arial" panose="02080604020202020204" pitchFamily="34" charset="0"/>
         <a:buChar char="»"/>
         <a:defRPr sz="2000" kern="1200">
           <a:solidFill>
@@ -3024,7 +2981,7 @@
         <a:spcBef>
           <a:spcPct val="20000"/>
         </a:spcBef>
-        <a:buFont typeface="Arial" pitchFamily="34" charset="0"/>
+        <a:buFont typeface="Arial" panose="02080604020202020204" pitchFamily="34" charset="0"/>
         <a:buChar char="•"/>
         <a:defRPr sz="2000" kern="1200">
           <a:solidFill>
@@ -3039,7 +2996,7 @@
         <a:spcBef>
           <a:spcPct val="20000"/>
         </a:spcBef>
-        <a:buFont typeface="Arial" pitchFamily="34" charset="0"/>
+        <a:buFont typeface="Arial" panose="02080604020202020204" pitchFamily="34" charset="0"/>
         <a:buChar char="•"/>
         <a:defRPr sz="2000" kern="1200">
           <a:solidFill>
@@ -3054,7 +3011,7 @@
         <a:spcBef>
           <a:spcPct val="20000"/>
         </a:spcBef>
-        <a:buFont typeface="Arial" pitchFamily="34" charset="0"/>
+        <a:buFont typeface="Arial" panose="02080604020202020204" pitchFamily="34" charset="0"/>
         <a:buChar char="•"/>
         <a:defRPr sz="2000" kern="1200">
           <a:solidFill>
@@ -3069,7 +3026,7 @@
         <a:spcBef>
           <a:spcPct val="20000"/>
         </a:spcBef>
-        <a:buFont typeface="Arial" pitchFamily="34" charset="0"/>
+        <a:buFont typeface="Arial" panose="02080604020202020204" pitchFamily="34" charset="0"/>
         <a:buChar char="•"/>
         <a:defRPr sz="2000" kern="1200">
           <a:solidFill>
@@ -3248,11 +3205,6 @@
         </p:txBody>
       </p:sp>
     </p:spTree>
-    <p:extLst>
-      <p:ext uri="{BB962C8B-B14F-4D97-AF65-F5344CB8AC3E}">
-        <p14:creationId xmlns:p14="http://schemas.microsoft.com/office/powerpoint/2010/main" val="2083196928"/>
-      </p:ext>
-    </p:extLst>
   </p:cSld>
   <p:clrMapOvr>
     <a:masterClrMapping/>
@@ -3407,11 +3359,6 @@
         </p:txBody>
       </p:sp>
     </p:spTree>
-    <p:extLst>
-      <p:ext uri="{BB962C8B-B14F-4D97-AF65-F5344CB8AC3E}">
-        <p14:creationId xmlns:p14="http://schemas.microsoft.com/office/powerpoint/2010/main" val="134115922"/>
-      </p:ext>
-    </p:extLst>
   </p:cSld>
   <p:clrMapOvr>
     <a:masterClrMapping/>
@@ -3773,11 +3720,6 @@
         </p:txBody>
       </p:sp>
     </p:spTree>
-    <p:extLst>
-      <p:ext uri="{BB962C8B-B14F-4D97-AF65-F5344CB8AC3E}">
-        <p14:creationId xmlns:p14="http://schemas.microsoft.com/office/powerpoint/2010/main" val="3430230167"/>
-      </p:ext>
-    </p:extLst>
   </p:cSld>
   <p:clrMapOvr>
     <a:masterClrMapping/>
@@ -3955,11 +3897,6 @@
         </p:txBody>
       </p:sp>
     </p:spTree>
-    <p:extLst>
-      <p:ext uri="{BB962C8B-B14F-4D97-AF65-F5344CB8AC3E}">
-        <p14:creationId xmlns:p14="http://schemas.microsoft.com/office/powerpoint/2010/main" val="3293998395"/>
-      </p:ext>
-    </p:extLst>
   </p:cSld>
   <p:clrMapOvr>
     <a:masterClrMapping/>
@@ -4010,6 +3947,7 @@
               <a:rPr lang="zh-CN" altLang="en-US" dirty="0"/>
               <a:t>记录寄存器的扩展状态</a:t>
             </a:r>
+            <a:endParaRPr lang="zh-CN" altLang="en-US" dirty="0"/>
           </a:p>
         </p:txBody>
       </p:sp>
@@ -4034,6 +3972,7 @@
               <a:rPr lang="en-US" altLang="zh-CN" dirty="0" smtClean="0"/>
               <a:t>(mode, bit)</a:t>
             </a:r>
+            <a:endParaRPr lang="en-US" altLang="zh-CN" dirty="0" smtClean="0"/>
           </a:p>
           <a:p>
             <a:r>
@@ -4052,6 +3991,7 @@
               <a:rPr lang="en-US" altLang="zh-CN" dirty="0" smtClean="0"/>
               <a:t>SIGN_EXTENSION</a:t>
             </a:r>
+            <a:endParaRPr lang="en-US" altLang="zh-CN" dirty="0" smtClean="0"/>
           </a:p>
           <a:p>
             <a:pPr lvl="1"/>
@@ -4059,6 +3999,7 @@
               <a:rPr lang="en-US" altLang="zh-CN" dirty="0" smtClean="0"/>
               <a:t>ZERO_EXTENSION</a:t>
             </a:r>
+            <a:endParaRPr lang="en-US" altLang="zh-CN" dirty="0" smtClean="0"/>
           </a:p>
           <a:p>
             <a:pPr lvl="1"/>
@@ -4066,6 +4007,7 @@
               <a:rPr lang="en-US" altLang="zh-CN" dirty="0" smtClean="0"/>
               <a:t>UNKNOWN_EXTENSION</a:t>
             </a:r>
+            <a:endParaRPr lang="en-US" altLang="zh-CN" dirty="0" smtClean="0"/>
           </a:p>
           <a:p>
             <a:pPr lvl="1"/>
@@ -4073,6 +4015,7 @@
               <a:rPr lang="en-US" altLang="zh-CN" dirty="0" smtClean="0"/>
               <a:t>EM_X86_ADDRESS</a:t>
             </a:r>
+            <a:endParaRPr lang="en-US" altLang="zh-CN" dirty="0" smtClean="0"/>
           </a:p>
           <a:p>
             <a:pPr lvl="1"/>
@@ -4080,6 +4023,7 @@
               <a:rPr lang="en-US" altLang="zh-CN" dirty="0" smtClean="0"/>
               <a:t>EM_MIPS_ADDRESS</a:t>
             </a:r>
+            <a:endParaRPr lang="en-US" altLang="zh-CN" dirty="0" smtClean="0"/>
           </a:p>
           <a:p>
             <a:r>
@@ -4139,11 +4083,6 @@
         </p:txBody>
       </p:sp>
     </p:spTree>
-    <p:extLst>
-      <p:ext uri="{BB962C8B-B14F-4D97-AF65-F5344CB8AC3E}">
-        <p14:creationId xmlns:p14="http://schemas.microsoft.com/office/powerpoint/2010/main" val="3410143412"/>
-      </p:ext>
-    </p:extLst>
   </p:cSld>
   <p:clrMapOvr>
     <a:masterClrMapping/>
@@ -4257,6 +4196,10 @@
               </a:rPr>
               <a:t>, 32)</a:t>
             </a:r>
+            <a:endParaRPr lang="en-US" altLang="zh-CN" dirty="0" smtClean="0">
+              <a:latin typeface="Consolas" pitchFamily="49" charset="0"/>
+              <a:cs typeface="Consolas" pitchFamily="49" charset="0"/>
+            </a:endParaRPr>
           </a:p>
           <a:p>
             <a:r>
@@ -4280,6 +4223,10 @@
               </a:rPr>
               <a:t>, 32)</a:t>
             </a:r>
+            <a:endParaRPr lang="en-US" altLang="zh-CN" dirty="0" smtClean="0">
+              <a:latin typeface="Consolas" pitchFamily="49" charset="0"/>
+              <a:cs typeface="Consolas" pitchFamily="49" charset="0"/>
+            </a:endParaRPr>
           </a:p>
           <a:p>
             <a:r>
@@ -4317,6 +4264,10 @@
               </a:rPr>
               <a:t>, 31)</a:t>
             </a:r>
+            <a:endParaRPr lang="en-US" altLang="zh-CN" dirty="0" smtClean="0">
+              <a:latin typeface="Consolas" pitchFamily="49" charset="0"/>
+              <a:cs typeface="Consolas" pitchFamily="49" charset="0"/>
+            </a:endParaRPr>
           </a:p>
           <a:p>
             <a:r>
@@ -4354,6 +4305,10 @@
               </a:rPr>
               <a:t>, 48)</a:t>
             </a:r>
+            <a:endParaRPr lang="en-US" altLang="zh-CN" dirty="0" smtClean="0">
+              <a:latin typeface="Consolas" pitchFamily="49" charset="0"/>
+              <a:cs typeface="Consolas" pitchFamily="49" charset="0"/>
+            </a:endParaRPr>
           </a:p>
           <a:p>
             <a:r>
@@ -4391,6 +4346,10 @@
               </a:rPr>
               <a:t>, 16)</a:t>
             </a:r>
+            <a:endParaRPr lang="en-US" altLang="zh-CN" dirty="0" smtClean="0">
+              <a:latin typeface="Consolas" pitchFamily="49" charset="0"/>
+              <a:cs typeface="Consolas" pitchFamily="49" charset="0"/>
+            </a:endParaRPr>
           </a:p>
           <a:p>
             <a:r>
@@ -4456,6 +4415,10 @@
               </a:rPr>
               <a:t>, 17)</a:t>
             </a:r>
+            <a:endParaRPr lang="en-US" altLang="zh-CN" dirty="0" smtClean="0">
+              <a:latin typeface="Consolas" pitchFamily="49" charset="0"/>
+              <a:cs typeface="Consolas" pitchFamily="49" charset="0"/>
+            </a:endParaRPr>
           </a:p>
           <a:p>
             <a:r>
@@ -4535,6 +4498,10 @@
               </a:rPr>
               <a:t>, 1)</a:t>
             </a:r>
+            <a:endParaRPr lang="en-US" altLang="zh-CN" dirty="0" smtClean="0">
+              <a:latin typeface="Consolas" pitchFamily="49" charset="0"/>
+              <a:cs typeface="Consolas" pitchFamily="49" charset="0"/>
+            </a:endParaRPr>
           </a:p>
           <a:p>
             <a:r>
@@ -4558,6 +4525,10 @@
               </a:rPr>
               <a:t>, 0)</a:t>
             </a:r>
+            <a:endParaRPr lang="en-US" altLang="zh-CN" dirty="0" smtClean="0">
+              <a:latin typeface="Consolas" pitchFamily="49" charset="0"/>
+              <a:cs typeface="Consolas" pitchFamily="49" charset="0"/>
+            </a:endParaRPr>
           </a:p>
           <a:p>
             <a:endParaRPr lang="zh-CN" altLang="en-US" dirty="0">
@@ -4568,11 +4539,6 @@
         </p:txBody>
       </p:sp>
     </p:spTree>
-    <p:extLst>
-      <p:ext uri="{BB962C8B-B14F-4D97-AF65-F5344CB8AC3E}">
-        <p14:creationId xmlns:p14="http://schemas.microsoft.com/office/powerpoint/2010/main" val="3116525797"/>
-      </p:ext>
-    </p:extLst>
   </p:cSld>
   <p:clrMapOvr>
     <a:masterClrMapping/>
@@ -4698,6 +4664,7 @@
               <a:rPr lang="en-US" altLang="zh-CN" dirty="0" smtClean="0"/>
               <a:t>EM_X86_ADDRESS</a:t>
             </a:r>
+            <a:endParaRPr lang="en-US" altLang="zh-CN" dirty="0" smtClean="0"/>
           </a:p>
           <a:p>
             <a:pPr lvl="1"/>
@@ -4721,6 +4688,7 @@
               <a:rPr lang="en-US" altLang="zh-CN" dirty="0" smtClean="0"/>
               <a:t>4096</a:t>
             </a:r>
+            <a:endParaRPr lang="en-US" altLang="zh-CN" dirty="0" smtClean="0"/>
           </a:p>
           <a:p>
             <a:pPr lvl="1"/>
@@ -4760,11 +4728,6 @@
         </p:txBody>
       </p:sp>
     </p:spTree>
-    <p:extLst>
-      <p:ext uri="{BB962C8B-B14F-4D97-AF65-F5344CB8AC3E}">
-        <p14:creationId xmlns:p14="http://schemas.microsoft.com/office/powerpoint/2010/main" val="1891704981"/>
-      </p:ext>
-    </p:extLst>
   </p:cSld>
   <p:clrMapOvr>
     <a:masterClrMapping/>
@@ -4866,6 +4829,7 @@
               <a:rPr lang="en-US" altLang="zh-CN" dirty="0" smtClean="0"/>
               <a:t>, 32)</a:t>
             </a:r>
+            <a:endParaRPr lang="en-US" altLang="zh-CN" dirty="0" smtClean="0"/>
           </a:p>
           <a:p>
             <a:r>
@@ -4900,6 +4864,7 @@
               <a:rPr lang="en-US" altLang="zh-CN" dirty="0" smtClean="0"/>
               <a:t>, 33)</a:t>
             </a:r>
+            <a:endParaRPr lang="en-US" altLang="zh-CN" dirty="0" smtClean="0"/>
           </a:p>
           <a:p>
             <a:r>
@@ -4934,6 +4899,7 @@
               <a:rPr lang="en-US" altLang="zh-CN" dirty="0" smtClean="0"/>
               <a:t>, 17)</a:t>
             </a:r>
+            <a:endParaRPr lang="en-US" altLang="zh-CN" dirty="0" smtClean="0"/>
           </a:p>
           <a:p>
             <a:r>
@@ -4983,11 +4949,6 @@
         </p:txBody>
       </p:sp>
     </p:spTree>
-    <p:extLst>
-      <p:ext uri="{BB962C8B-B14F-4D97-AF65-F5344CB8AC3E}">
-        <p14:creationId xmlns:p14="http://schemas.microsoft.com/office/powerpoint/2010/main" val="3402302196"/>
-      </p:ext>
-    </p:extLst>
   </p:cSld>
   <p:clrMapOvr>
     <a:masterClrMapping/>
@@ -5053,7 +5014,7 @@
           <p:nvPr/>
         </p:nvPicPr>
         <p:blipFill>
-          <a:blip r:embed="rId2">
+          <a:blip r:embed="rId1">
             <a:extLst>
               <a:ext uri="{28A0092B-C50C-407E-A947-70E740481C1C}">
                 <a14:useLocalDpi xmlns:a14="http://schemas.microsoft.com/office/drawing/2010/main" val="0"/>
@@ -5109,11 +5070,6 @@
         </p:spPr>
       </p:pic>
     </p:spTree>
-    <p:extLst>
-      <p:ext uri="{BB962C8B-B14F-4D97-AF65-F5344CB8AC3E}">
-        <p14:creationId xmlns:p14="http://schemas.microsoft.com/office/powerpoint/2010/main" val="1654292674"/>
-      </p:ext>
-    </p:extLst>
   </p:cSld>
   <p:clrMapOvr>
     <a:masterClrMapping/>
@@ -5177,7 +5133,7 @@
           <p:nvPr/>
         </p:nvPicPr>
         <p:blipFill>
-          <a:blip r:embed="rId2">
+          <a:blip r:embed="rId1">
             <a:extLst>
               <a:ext uri="{28A0092B-C50C-407E-A947-70E740481C1C}">
                 <a14:useLocalDpi xmlns:a14="http://schemas.microsoft.com/office/drawing/2010/main" val="0"/>
@@ -5233,11 +5189,6 @@
         </p:spPr>
       </p:pic>
     </p:spTree>
-    <p:extLst>
-      <p:ext uri="{BB962C8B-B14F-4D97-AF65-F5344CB8AC3E}">
-        <p14:creationId xmlns:p14="http://schemas.microsoft.com/office/powerpoint/2010/main" val="1615340306"/>
-      </p:ext>
-    </p:extLst>
   </p:cSld>
   <p:clrMapOvr>
     <a:masterClrMapping/>
@@ -5301,7 +5252,7 @@
           <p:nvPr/>
         </p:nvPicPr>
         <p:blipFill>
-          <a:blip r:embed="rId2">
+          <a:blip r:embed="rId1">
             <a:extLst>
               <a:ext uri="{28A0092B-C50C-407E-A947-70E740481C1C}">
                 <a14:useLocalDpi xmlns:a14="http://schemas.microsoft.com/office/drawing/2010/main" val="0"/>
@@ -5365,7 +5316,7 @@
           <p:nvPr/>
         </p:nvPicPr>
         <p:blipFill>
-          <a:blip r:embed="rId3">
+          <a:blip r:embed="rId2">
             <a:extLst>
               <a:ext uri="{28A0092B-C50C-407E-A947-70E740481C1C}">
                 <a14:useLocalDpi xmlns:a14="http://schemas.microsoft.com/office/drawing/2010/main" val="0"/>
@@ -5421,11 +5372,6 @@
         </p:spPr>
       </p:pic>
     </p:spTree>
-    <p:extLst>
-      <p:ext uri="{BB962C8B-B14F-4D97-AF65-F5344CB8AC3E}">
-        <p14:creationId xmlns:p14="http://schemas.microsoft.com/office/powerpoint/2010/main" val="845892337"/>
-      </p:ext>
-    </p:extLst>
   </p:cSld>
   <p:clrMapOvr>
     <a:masterClrMapping/>
@@ -5559,6 +5505,7 @@
               <a:rPr lang="en-US" altLang="zh-CN" dirty="0" smtClean="0"/>
               <a:t>, …</a:t>
             </a:r>
+            <a:endParaRPr lang="en-US" altLang="zh-CN" dirty="0" smtClean="0"/>
           </a:p>
           <a:p>
             <a:pPr lvl="1"/>
@@ -5653,6 +5600,7 @@
               <a:rPr lang="en-US" altLang="zh-CN" dirty="0" smtClean="0"/>
               <a:t>, dsll32, …</a:t>
             </a:r>
+            <a:endParaRPr lang="en-US" altLang="zh-CN" dirty="0" smtClean="0"/>
           </a:p>
           <a:p>
             <a:pPr lvl="1"/>
@@ -5700,6 +5648,7 @@
               <a:rPr lang="en-US" altLang="zh-CN" dirty="0" smtClean="0"/>
               <a:t>, …</a:t>
             </a:r>
+            <a:endParaRPr lang="en-US" altLang="zh-CN" dirty="0" smtClean="0"/>
           </a:p>
           <a:p>
             <a:pPr lvl="1"/>
@@ -5744,11 +5693,6 @@
         </p:txBody>
       </p:sp>
     </p:spTree>
-    <p:extLst>
-      <p:ext uri="{BB962C8B-B14F-4D97-AF65-F5344CB8AC3E}">
-        <p14:creationId xmlns:p14="http://schemas.microsoft.com/office/powerpoint/2010/main" val="2213462382"/>
-      </p:ext>
-    </p:extLst>
   </p:cSld>
   <p:clrMapOvr>
     <a:masterClrMapping/>
@@ -5812,7 +5756,7 @@
           <p:nvPr/>
         </p:nvPicPr>
         <p:blipFill>
-          <a:blip r:embed="rId2">
+          <a:blip r:embed="rId1">
             <a:extLst>
               <a:ext uri="{28A0092B-C50C-407E-A947-70E740481C1C}">
                 <a14:useLocalDpi xmlns:a14="http://schemas.microsoft.com/office/drawing/2010/main" val="0"/>
@@ -5868,11 +5812,6 @@
         </p:spPr>
       </p:pic>
     </p:spTree>
-    <p:extLst>
-      <p:ext uri="{BB962C8B-B14F-4D97-AF65-F5344CB8AC3E}">
-        <p14:creationId xmlns:p14="http://schemas.microsoft.com/office/powerpoint/2010/main" val="1053280283"/>
-      </p:ext>
-    </p:extLst>
   </p:cSld>
   <p:clrMapOvr>
     <a:masterClrMapping/>
@@ -6032,6 +5971,7 @@
               <a:rPr lang="zh-CN" altLang="en-US" dirty="0"/>
               <a:t>）</a:t>
             </a:r>
+            <a:endParaRPr lang="zh-CN" altLang="en-US" dirty="0"/>
           </a:p>
         </p:txBody>
       </p:sp>
@@ -6207,11 +6147,6 @@
         </p:txBody>
       </p:sp>
     </p:spTree>
-    <p:extLst>
-      <p:ext uri="{BB962C8B-B14F-4D97-AF65-F5344CB8AC3E}">
-        <p14:creationId xmlns:p14="http://schemas.microsoft.com/office/powerpoint/2010/main" val="1068247903"/>
-      </p:ext>
-    </p:extLst>
   </p:cSld>
   <p:clrMapOvr>
     <a:masterClrMapping/>
@@ -6365,11 +6300,6 @@
         </p:txBody>
       </p:sp>
     </p:spTree>
-    <p:extLst>
-      <p:ext uri="{BB962C8B-B14F-4D97-AF65-F5344CB8AC3E}">
-        <p14:creationId xmlns:p14="http://schemas.microsoft.com/office/powerpoint/2010/main" val="4272240094"/>
-      </p:ext>
-    </p:extLst>
   </p:cSld>
   <p:clrMapOvr>
     <a:masterClrMapping/>
@@ -6533,11 +6463,6 @@
         </p:txBody>
       </p:sp>
     </p:spTree>
-    <p:extLst>
-      <p:ext uri="{BB962C8B-B14F-4D97-AF65-F5344CB8AC3E}">
-        <p14:creationId xmlns:p14="http://schemas.microsoft.com/office/powerpoint/2010/main" val="3992073736"/>
-      </p:ext>
-    </p:extLst>
   </p:cSld>
   <p:clrMapOvr>
     <a:masterClrMapping/>
@@ -6705,63 +6630,26 @@
               </a:rPr>
               <a:t>0x7000 0000 + 0x2000 0000</a:t>
             </a:r>
-          </a:p>
-          <a:p>
-            <a:pPr lvl="1"/>
-            <a:r>
-              <a:rPr lang="en-US" altLang="zh-CN" dirty="0" smtClean="0">
-                <a:latin typeface="Consolas" pitchFamily="49" charset="0"/>
-                <a:cs typeface="Consolas" pitchFamily="49" charset="0"/>
-              </a:rPr>
-              <a:t>0x8000 0000 + 0xffff </a:t>
-            </a:r>
-            <a:r>
-              <a:rPr lang="en-US" altLang="zh-CN" dirty="0" err="1" smtClean="0">
-                <a:latin typeface="Consolas" pitchFamily="49" charset="0"/>
-                <a:cs typeface="Consolas" pitchFamily="49" charset="0"/>
-              </a:rPr>
-              <a:t>ffff</a:t>
-            </a:r>
             <a:endParaRPr lang="en-US" altLang="zh-CN" dirty="0" smtClean="0">
               <a:latin typeface="Consolas" pitchFamily="49" charset="0"/>
               <a:cs typeface="Consolas" pitchFamily="49" charset="0"/>
             </a:endParaRPr>
           </a:p>
           <a:p>
-            <a:r>
-              <a:rPr lang="zh-CN" altLang="en-US" dirty="0" smtClean="0">
-                <a:latin typeface="Consolas" pitchFamily="49" charset="0"/>
-                <a:cs typeface="Consolas" pitchFamily="49" charset="0"/>
-              </a:rPr>
-              <a:t>零扩展</a:t>
-            </a:r>
+            <a:pPr lvl="1"/>
             <a:r>
               <a:rPr lang="en-US" altLang="zh-CN" dirty="0" smtClean="0">
                 <a:latin typeface="Consolas" pitchFamily="49" charset="0"/>
                 <a:cs typeface="Consolas" pitchFamily="49" charset="0"/>
               </a:rPr>
-              <a:t>+</a:t>
-            </a:r>
-            <a:r>
-              <a:rPr lang="zh-CN" altLang="en-US" dirty="0" smtClean="0">
-                <a:latin typeface="Consolas" pitchFamily="49" charset="0"/>
-                <a:cs typeface="Consolas" pitchFamily="49" charset="0"/>
-              </a:rPr>
-              <a:t>零扩展</a:t>
-            </a:r>
-            <a:r>
-              <a:rPr lang="en-US" altLang="zh-CN" dirty="0" smtClean="0">
-                <a:latin typeface="Consolas" pitchFamily="49" charset="0"/>
-                <a:cs typeface="Consolas" pitchFamily="49" charset="0"/>
-              </a:rPr>
-              <a:t>=</a:t>
-            </a:r>
-            <a:r>
-              <a:rPr lang="zh-CN" altLang="en-US" dirty="0" smtClean="0">
-                <a:latin typeface="Consolas" pitchFamily="49" charset="0"/>
-                <a:cs typeface="Consolas" pitchFamily="49" charset="0"/>
-              </a:rPr>
-              <a:t>？</a:t>
+              <a:t>0x8000 0000 + 0xffff </a:t>
+            </a:r>
+            <a:r>
+              <a:rPr lang="en-US" altLang="zh-CN" dirty="0" err="1" smtClean="0">
+                <a:latin typeface="Consolas" pitchFamily="49" charset="0"/>
+                <a:cs typeface="Consolas" pitchFamily="49" charset="0"/>
+              </a:rPr>
+              <a:t>ffff</a:t>
             </a:r>
             <a:endParaRPr lang="en-US" altLang="zh-CN" dirty="0" smtClean="0">
               <a:latin typeface="Consolas" pitchFamily="49" charset="0"/>
@@ -6769,22 +6657,12 @@
             </a:endParaRPr>
           </a:p>
           <a:p>
-            <a:pPr lvl="1"/>
-            <a:r>
-              <a:rPr lang="en-US" altLang="zh-CN" dirty="0" smtClean="0">
-                <a:latin typeface="Consolas" pitchFamily="49" charset="0"/>
-                <a:cs typeface="Consolas" pitchFamily="49" charset="0"/>
-              </a:rPr>
-              <a:t>0x8000 0000 + 0x9000 0000</a:t>
-            </a:r>
-          </a:p>
-          <a:p>
             <a:r>
               <a:rPr lang="zh-CN" altLang="en-US" dirty="0" smtClean="0">
                 <a:latin typeface="Consolas" pitchFamily="49" charset="0"/>
                 <a:cs typeface="Consolas" pitchFamily="49" charset="0"/>
               </a:rPr>
-              <a:t>符号扩展</a:t>
+              <a:t>零扩展</a:t>
             </a:r>
             <a:r>
               <a:rPr lang="en-US" altLang="zh-CN" dirty="0" smtClean="0">
@@ -6826,8 +6704,67 @@
                 <a:latin typeface="Consolas" pitchFamily="49" charset="0"/>
                 <a:cs typeface="Consolas" pitchFamily="49" charset="0"/>
               </a:rPr>
+              <a:t>0x8000 0000 + 0x9000 0000</a:t>
+            </a:r>
+            <a:endParaRPr lang="en-US" altLang="zh-CN" dirty="0" smtClean="0">
+              <a:latin typeface="Consolas" pitchFamily="49" charset="0"/>
+              <a:cs typeface="Consolas" pitchFamily="49" charset="0"/>
+            </a:endParaRPr>
+          </a:p>
+          <a:p>
+            <a:r>
+              <a:rPr lang="zh-CN" altLang="en-US" dirty="0" smtClean="0">
+                <a:latin typeface="Consolas" pitchFamily="49" charset="0"/>
+                <a:cs typeface="Consolas" pitchFamily="49" charset="0"/>
+              </a:rPr>
+              <a:t>符号扩展</a:t>
+            </a:r>
+            <a:r>
+              <a:rPr lang="en-US" altLang="zh-CN" dirty="0" smtClean="0">
+                <a:latin typeface="Consolas" pitchFamily="49" charset="0"/>
+                <a:cs typeface="Consolas" pitchFamily="49" charset="0"/>
+              </a:rPr>
+              <a:t>+</a:t>
+            </a:r>
+            <a:r>
+              <a:rPr lang="zh-CN" altLang="en-US" dirty="0" smtClean="0">
+                <a:latin typeface="Consolas" pitchFamily="49" charset="0"/>
+                <a:cs typeface="Consolas" pitchFamily="49" charset="0"/>
+              </a:rPr>
+              <a:t>零扩展</a:t>
+            </a:r>
+            <a:r>
+              <a:rPr lang="en-US" altLang="zh-CN" dirty="0" smtClean="0">
+                <a:latin typeface="Consolas" pitchFamily="49" charset="0"/>
+                <a:cs typeface="Consolas" pitchFamily="49" charset="0"/>
+              </a:rPr>
+              <a:t>=</a:t>
+            </a:r>
+            <a:r>
+              <a:rPr lang="zh-CN" altLang="en-US" dirty="0" smtClean="0">
+                <a:latin typeface="Consolas" pitchFamily="49" charset="0"/>
+                <a:cs typeface="Consolas" pitchFamily="49" charset="0"/>
+              </a:rPr>
+              <a:t>？</a:t>
+            </a:r>
+            <a:endParaRPr lang="en-US" altLang="zh-CN" dirty="0" smtClean="0">
+              <a:latin typeface="Consolas" pitchFamily="49" charset="0"/>
+              <a:cs typeface="Consolas" pitchFamily="49" charset="0"/>
+            </a:endParaRPr>
+          </a:p>
+          <a:p>
+            <a:pPr lvl="1"/>
+            <a:r>
+              <a:rPr lang="en-US" altLang="zh-CN" dirty="0" smtClean="0">
+                <a:latin typeface="Consolas" pitchFamily="49" charset="0"/>
+                <a:cs typeface="Consolas" pitchFamily="49" charset="0"/>
+              </a:rPr>
               <a:t>0x7000 0000 + 0x9000 0000</a:t>
             </a:r>
+            <a:endParaRPr lang="en-US" altLang="zh-CN" dirty="0" smtClean="0">
+              <a:latin typeface="Consolas" pitchFamily="49" charset="0"/>
+              <a:cs typeface="Consolas" pitchFamily="49" charset="0"/>
+            </a:endParaRPr>
           </a:p>
           <a:p>
             <a:pPr lvl="1"/>
@@ -6860,11 +6797,6 @@
         </p:txBody>
       </p:sp>
     </p:spTree>
-    <p:extLst>
-      <p:ext uri="{BB962C8B-B14F-4D97-AF65-F5344CB8AC3E}">
-        <p14:creationId xmlns:p14="http://schemas.microsoft.com/office/powerpoint/2010/main" val="4131730527"/>
-      </p:ext>
-    </p:extLst>
   </p:cSld>
   <p:clrMapOvr>
     <a:masterClrMapping/>
@@ -7092,11 +7024,6 @@
         </p:txBody>
       </p:sp>
     </p:spTree>
-    <p:extLst>
-      <p:ext uri="{BB962C8B-B14F-4D97-AF65-F5344CB8AC3E}">
-        <p14:creationId xmlns:p14="http://schemas.microsoft.com/office/powerpoint/2010/main" val="2109930880"/>
-      </p:ext>
-    </p:extLst>
   </p:cSld>
   <p:clrMapOvr>
     <a:masterClrMapping/>
@@ -7445,11 +7372,6 @@
         </p:txBody>
       </p:sp>
     </p:spTree>
-    <p:extLst>
-      <p:ext uri="{BB962C8B-B14F-4D97-AF65-F5344CB8AC3E}">
-        <p14:creationId xmlns:p14="http://schemas.microsoft.com/office/powerpoint/2010/main" val="1648811675"/>
-      </p:ext>
-    </p:extLst>
   </p:cSld>
   <p:clrMapOvr>
     <a:masterClrMapping/>
@@ -7612,11 +7534,6 @@
         </p:txBody>
       </p:sp>
     </p:spTree>
-    <p:extLst>
-      <p:ext uri="{BB962C8B-B14F-4D97-AF65-F5344CB8AC3E}">
-        <p14:creationId xmlns:p14="http://schemas.microsoft.com/office/powerpoint/2010/main" val="2121368701"/>
-      </p:ext>
-    </p:extLst>
   </p:cSld>
   <p:clrMapOvr>
     <a:masterClrMapping/>
@@ -7940,11 +7857,6 @@
         </p:txBody>
       </p:sp>
     </p:spTree>
-    <p:extLst>
-      <p:ext uri="{BB962C8B-B14F-4D97-AF65-F5344CB8AC3E}">
-        <p14:creationId xmlns:p14="http://schemas.microsoft.com/office/powerpoint/2010/main" val="4042251975"/>
-      </p:ext>
-    </p:extLst>
   </p:cSld>
   <p:clrMapOvr>
     <a:masterClrMapping/>
@@ -8206,11 +8118,6 @@
         </p:txBody>
       </p:sp>
     </p:spTree>
-    <p:extLst>
-      <p:ext uri="{BB962C8B-B14F-4D97-AF65-F5344CB8AC3E}">
-        <p14:creationId xmlns:p14="http://schemas.microsoft.com/office/powerpoint/2010/main" val="3185680719"/>
-      </p:ext>
-    </p:extLst>
   </p:cSld>
   <p:clrMapOvr>
     <a:masterClrMapping/>
@@ -8503,11 +8410,6 @@
         </p:txBody>
       </p:sp>
     </p:spTree>
-    <p:extLst>
-      <p:ext uri="{BB962C8B-B14F-4D97-AF65-F5344CB8AC3E}">
-        <p14:creationId xmlns:p14="http://schemas.microsoft.com/office/powerpoint/2010/main" val="1731641756"/>
-      </p:ext>
-    </p:extLst>
   </p:cSld>
   <p:clrMapOvr>
     <a:masterClrMapping/>
@@ -8923,7 +8825,10 @@
       </a:bgFillStyleLst>
     </a:fmtScheme>
   </a:themeElements>
-  <a:objectDefaults/>
-  <a:extraClrSchemeLst/>
+  <a:extLst>
+    <a:ext uri="{05A4C25C-085E-4340-85A3-A5531E510DB2}">
+      <thm15:themeFamily xmlns:thm15="http://schemas.microsoft.com/office/thememl/2012/main" name="Office Theme" id="{62F939B6-93AF-4DB8-9C6B-D6C7DFDC589F}" vid="{4A3C46E8-61CC-4603-A589-7422A47A8E4A}"/>
+    </a:ext>
+  </a:extLst>
 </a:theme>
 </file>
</xml_diff>